<commit_message>
Added physics, movement inertia and weird gravity Modified custom hitbox, removed from the player and added to icecream ball instead Hitbox situation now: get LAST icecreamball (on top) last 20 px -> this will be the HIT hitbox (and x can be different than player now)  && get ALL icecream balls EXCEPT top one -> this is the MISS hitbox (side collision)
</commit_message>
<xml_diff>
--- a/img/imgrepository.pptx
+++ b/img/imgrepository.pptx
@@ -12,6 +12,8 @@
     <p:sldId id="260" r:id="rId6"/>
     <p:sldId id="261" r:id="rId7"/>
     <p:sldId id="262" r:id="rId8"/>
+    <p:sldId id="263" r:id="rId9"/>
+    <p:sldId id="264" r:id="rId10"/>
   </p:sldIdLst>
   <p:sldSz cx="12192000" cy="6858000"/>
   <p:notesSz cx="6858000" cy="9144000"/>
@@ -110,6 +112,11 @@
       </a:defRPr>
     </a:lvl9pPr>
   </p:defaultTextStyle>
+  <p:extLst>
+    <p:ext uri="{EFAFB233-063F-42B5-8137-9DF3F51BA10A}">
+      <p15:sldGuideLst xmlns:p15="http://schemas.microsoft.com/office/powerpoint/2012/main"/>
+    </p:ext>
+  </p:extLst>
 </p:presentation>
 </file>
 
@@ -260,7 +267,7 @@
           <a:p>
             <a:fld id="{BF6C1C6C-F969-4304-A2EB-23BEDD11B234}" type="datetimeFigureOut">
               <a:rPr lang="en-US" smtClean="0"/>
-              <a:t>8/15/2023</a:t>
+              <a:t>8/16/2023</a:t>
             </a:fld>
             <a:endParaRPr lang="en-US"/>
           </a:p>
@@ -458,7 +465,7 @@
           <a:p>
             <a:fld id="{BF6C1C6C-F969-4304-A2EB-23BEDD11B234}" type="datetimeFigureOut">
               <a:rPr lang="en-US" smtClean="0"/>
-              <a:t>8/15/2023</a:t>
+              <a:t>8/16/2023</a:t>
             </a:fld>
             <a:endParaRPr lang="en-US"/>
           </a:p>
@@ -666,7 +673,7 @@
           <a:p>
             <a:fld id="{BF6C1C6C-F969-4304-A2EB-23BEDD11B234}" type="datetimeFigureOut">
               <a:rPr lang="en-US" smtClean="0"/>
-              <a:t>8/15/2023</a:t>
+              <a:t>8/16/2023</a:t>
             </a:fld>
             <a:endParaRPr lang="en-US"/>
           </a:p>
@@ -864,7 +871,7 @@
           <a:p>
             <a:fld id="{BF6C1C6C-F969-4304-A2EB-23BEDD11B234}" type="datetimeFigureOut">
               <a:rPr lang="en-US" smtClean="0"/>
-              <a:t>8/15/2023</a:t>
+              <a:t>8/16/2023</a:t>
             </a:fld>
             <a:endParaRPr lang="en-US"/>
           </a:p>
@@ -1139,7 +1146,7 @@
           <a:p>
             <a:fld id="{BF6C1C6C-F969-4304-A2EB-23BEDD11B234}" type="datetimeFigureOut">
               <a:rPr lang="en-US" smtClean="0"/>
-              <a:t>8/15/2023</a:t>
+              <a:t>8/16/2023</a:t>
             </a:fld>
             <a:endParaRPr lang="en-US"/>
           </a:p>
@@ -1404,7 +1411,7 @@
           <a:p>
             <a:fld id="{BF6C1C6C-F969-4304-A2EB-23BEDD11B234}" type="datetimeFigureOut">
               <a:rPr lang="en-US" smtClean="0"/>
-              <a:t>8/15/2023</a:t>
+              <a:t>8/16/2023</a:t>
             </a:fld>
             <a:endParaRPr lang="en-US"/>
           </a:p>
@@ -1816,7 +1823,7 @@
           <a:p>
             <a:fld id="{BF6C1C6C-F969-4304-A2EB-23BEDD11B234}" type="datetimeFigureOut">
               <a:rPr lang="en-US" smtClean="0"/>
-              <a:t>8/15/2023</a:t>
+              <a:t>8/16/2023</a:t>
             </a:fld>
             <a:endParaRPr lang="en-US"/>
           </a:p>
@@ -1957,7 +1964,7 @@
           <a:p>
             <a:fld id="{BF6C1C6C-F969-4304-A2EB-23BEDD11B234}" type="datetimeFigureOut">
               <a:rPr lang="en-US" smtClean="0"/>
-              <a:t>8/15/2023</a:t>
+              <a:t>8/16/2023</a:t>
             </a:fld>
             <a:endParaRPr lang="en-US"/>
           </a:p>
@@ -2070,7 +2077,7 @@
           <a:p>
             <a:fld id="{BF6C1C6C-F969-4304-A2EB-23BEDD11B234}" type="datetimeFigureOut">
               <a:rPr lang="en-US" smtClean="0"/>
-              <a:t>8/15/2023</a:t>
+              <a:t>8/16/2023</a:t>
             </a:fld>
             <a:endParaRPr lang="en-US"/>
           </a:p>
@@ -2381,7 +2388,7 @@
           <a:p>
             <a:fld id="{BF6C1C6C-F969-4304-A2EB-23BEDD11B234}" type="datetimeFigureOut">
               <a:rPr lang="en-US" smtClean="0"/>
-              <a:t>8/15/2023</a:t>
+              <a:t>8/16/2023</a:t>
             </a:fld>
             <a:endParaRPr lang="en-US"/>
           </a:p>
@@ -2669,7 +2676,7 @@
           <a:p>
             <a:fld id="{BF6C1C6C-F969-4304-A2EB-23BEDD11B234}" type="datetimeFigureOut">
               <a:rPr lang="en-US" smtClean="0"/>
-              <a:t>8/15/2023</a:t>
+              <a:t>8/16/2023</a:t>
             </a:fld>
             <a:endParaRPr lang="en-US"/>
           </a:p>
@@ -2910,7 +2917,7 @@
           <a:p>
             <a:fld id="{BF6C1C6C-F969-4304-A2EB-23BEDD11B234}" type="datetimeFigureOut">
               <a:rPr lang="en-US" smtClean="0"/>
-              <a:t>8/15/2023</a:t>
+              <a:t>8/16/2023</a:t>
             </a:fld>
             <a:endParaRPr lang="en-US"/>
           </a:p>
@@ -4031,10 +4038,795 @@
           </a:prstGeom>
         </p:spPr>
       </p:pic>
+      <p:pic>
+        <p:nvPicPr>
+          <p:cNvPr id="2" name="Picture 2" descr="Ice Cream Background Images - Free Download on Freepik">
+            <a:extLst>
+              <a:ext uri="{FF2B5EF4-FFF2-40B4-BE49-F238E27FC236}">
+                <a16:creationId xmlns:a16="http://schemas.microsoft.com/office/drawing/2014/main" id="{CE6A4DED-C5C2-20E3-22E5-F94664AFE655}"/>
+              </a:ext>
+            </a:extLst>
+          </p:cNvPr>
+          <p:cNvPicPr>
+            <a:picLocks noChangeAspect="1" noChangeArrowheads="1"/>
+          </p:cNvPicPr>
+          <p:nvPr/>
+        </p:nvPicPr>
+        <p:blipFill>
+          <a:blip r:embed="rId4">
+            <a:extLst>
+              <a:ext uri="{28A0092B-C50C-407E-A947-70E740481C1C}">
+                <a14:useLocalDpi xmlns:a14="http://schemas.microsoft.com/office/drawing/2010/main" val="0"/>
+              </a:ext>
+            </a:extLst>
+          </a:blip>
+          <a:srcRect/>
+          <a:stretch>
+            <a:fillRect/>
+          </a:stretch>
+        </p:blipFill>
+        <p:spPr bwMode="auto">
+          <a:xfrm>
+            <a:off x="768619" y="639246"/>
+            <a:ext cx="4980928" cy="3317966"/>
+          </a:xfrm>
+          <a:prstGeom prst="rect">
+            <a:avLst/>
+          </a:prstGeom>
+          <a:noFill/>
+          <a:extLst>
+            <a:ext uri="{909E8E84-426E-40DD-AFC4-6F175D3DCCD1}">
+              <a14:hiddenFill xmlns:a14="http://schemas.microsoft.com/office/drawing/2010/main">
+                <a:solidFill>
+                  <a:srgbClr val="FFFFFF"/>
+                </a:solidFill>
+              </a14:hiddenFill>
+            </a:ext>
+          </a:extLst>
+        </p:spPr>
+      </p:pic>
     </p:spTree>
     <p:extLst>
       <p:ext uri="{BB962C8B-B14F-4D97-AF65-F5344CB8AC3E}">
         <p14:creationId xmlns:p14="http://schemas.microsoft.com/office/powerpoint/2010/main" val="1363999729"/>
+      </p:ext>
+    </p:extLst>
+  </p:cSld>
+  <p:clrMapOvr>
+    <a:masterClrMapping/>
+  </p:clrMapOvr>
+</p:sld>
+</file>
+
+<file path=ppt/slides/slide8.xml><?xml version="1.0" encoding="utf-8"?>
+<p:sld xmlns:a="http://schemas.openxmlformats.org/drawingml/2006/main" xmlns:r="http://schemas.openxmlformats.org/officeDocument/2006/relationships" xmlns:p="http://schemas.openxmlformats.org/presentationml/2006/main">
+  <p:cSld>
+    <p:bg>
+      <p:bgPr>
+        <a:solidFill>
+          <a:schemeClr val="tx1">
+            <a:lumMod val="85000"/>
+            <a:lumOff val="15000"/>
+          </a:schemeClr>
+        </a:solidFill>
+        <a:effectLst/>
+      </p:bgPr>
+    </p:bg>
+    <p:spTree>
+      <p:nvGrpSpPr>
+        <p:cNvPr id="1" name=""/>
+        <p:cNvGrpSpPr/>
+        <p:nvPr/>
+      </p:nvGrpSpPr>
+      <p:grpSpPr>
+        <a:xfrm>
+          <a:off x="0" y="0"/>
+          <a:ext cx="0" cy="0"/>
+          <a:chOff x="0" y="0"/>
+          <a:chExt cx="0" cy="0"/>
+        </a:xfrm>
+      </p:grpSpPr>
+      <p:pic>
+        <p:nvPicPr>
+          <p:cNvPr id="1026" name="Picture 2" descr="Ice Cream Background Images - Free Download on Freepik">
+            <a:extLst>
+              <a:ext uri="{FF2B5EF4-FFF2-40B4-BE49-F238E27FC236}">
+                <a16:creationId xmlns:a16="http://schemas.microsoft.com/office/drawing/2014/main" id="{704EEFB9-84E0-3624-F682-D62CCEC55EAC}"/>
+              </a:ext>
+            </a:extLst>
+          </p:cNvPr>
+          <p:cNvPicPr>
+            <a:picLocks noChangeAspect="1" noChangeArrowheads="1"/>
+          </p:cNvPicPr>
+          <p:nvPr/>
+        </p:nvPicPr>
+        <p:blipFill rotWithShape="1">
+          <a:blip r:embed="rId2">
+            <a:extLst>
+              <a:ext uri="{28A0092B-C50C-407E-A947-70E740481C1C}">
+                <a14:useLocalDpi xmlns:a14="http://schemas.microsoft.com/office/drawing/2010/main" val="0"/>
+              </a:ext>
+            </a:extLst>
+          </a:blip>
+          <a:srcRect t="40457"/>
+          <a:stretch/>
+        </p:blipFill>
+        <p:spPr bwMode="auto">
+          <a:xfrm>
+            <a:off x="713064" y="5696751"/>
+            <a:ext cx="2927758" cy="1161249"/>
+          </a:xfrm>
+          <a:prstGeom prst="rect">
+            <a:avLst/>
+          </a:prstGeom>
+          <a:noFill/>
+          <a:extLst>
+            <a:ext uri="{909E8E84-426E-40DD-AFC4-6F175D3DCCD1}">
+              <a14:hiddenFill xmlns:a14="http://schemas.microsoft.com/office/drawing/2010/main">
+                <a:solidFill>
+                  <a:srgbClr val="FFFFFF"/>
+                </a:solidFill>
+              </a14:hiddenFill>
+            </a:ext>
+          </a:extLst>
+        </p:spPr>
+      </p:pic>
+      <p:pic>
+        <p:nvPicPr>
+          <p:cNvPr id="6" name="Picture 2" descr="Ice Cream Background Images - Free Download on Freepik">
+            <a:extLst>
+              <a:ext uri="{FF2B5EF4-FFF2-40B4-BE49-F238E27FC236}">
+                <a16:creationId xmlns:a16="http://schemas.microsoft.com/office/drawing/2014/main" id="{96A64833-64F8-8B29-8E1B-113B889E0707}"/>
+              </a:ext>
+            </a:extLst>
+          </p:cNvPr>
+          <p:cNvPicPr>
+            <a:picLocks noChangeAspect="1" noChangeArrowheads="1"/>
+          </p:cNvPicPr>
+          <p:nvPr/>
+        </p:nvPicPr>
+        <p:blipFill rotWithShape="1">
+          <a:blip r:embed="rId2">
+            <a:extLst>
+              <a:ext uri="{28A0092B-C50C-407E-A947-70E740481C1C}">
+                <a14:useLocalDpi xmlns:a14="http://schemas.microsoft.com/office/drawing/2010/main" val="0"/>
+              </a:ext>
+            </a:extLst>
+          </a:blip>
+          <a:srcRect t="40457"/>
+          <a:stretch/>
+        </p:blipFill>
+        <p:spPr bwMode="auto">
+          <a:xfrm>
+            <a:off x="3640822" y="5696750"/>
+            <a:ext cx="2838944" cy="1126023"/>
+          </a:xfrm>
+          <a:prstGeom prst="rect">
+            <a:avLst/>
+          </a:prstGeom>
+          <a:noFill/>
+          <a:extLst>
+            <a:ext uri="{909E8E84-426E-40DD-AFC4-6F175D3DCCD1}">
+              <a14:hiddenFill xmlns:a14="http://schemas.microsoft.com/office/drawing/2010/main">
+                <a:solidFill>
+                  <a:srgbClr val="FFFFFF"/>
+                </a:solidFill>
+              </a14:hiddenFill>
+            </a:ext>
+          </a:extLst>
+        </p:spPr>
+      </p:pic>
+      <p:pic>
+        <p:nvPicPr>
+          <p:cNvPr id="9" name="Picture 2" descr="Ice Cream Background Images - Free Download on Freepik">
+            <a:extLst>
+              <a:ext uri="{FF2B5EF4-FFF2-40B4-BE49-F238E27FC236}">
+                <a16:creationId xmlns:a16="http://schemas.microsoft.com/office/drawing/2014/main" id="{D21EDCC6-3BA7-5CC3-3E9B-190A46CF596D}"/>
+              </a:ext>
+            </a:extLst>
+          </p:cNvPr>
+          <p:cNvPicPr>
+            <a:picLocks noChangeAspect="1" noChangeArrowheads="1"/>
+          </p:cNvPicPr>
+          <p:nvPr/>
+        </p:nvPicPr>
+        <p:blipFill rotWithShape="1">
+          <a:blip r:embed="rId2">
+            <a:extLst>
+              <a:ext uri="{28A0092B-C50C-407E-A947-70E740481C1C}">
+                <a14:useLocalDpi xmlns:a14="http://schemas.microsoft.com/office/drawing/2010/main" val="0"/>
+              </a:ext>
+            </a:extLst>
+          </a:blip>
+          <a:srcRect t="40457"/>
+          <a:stretch/>
+        </p:blipFill>
+        <p:spPr bwMode="auto">
+          <a:xfrm rot="10800000">
+            <a:off x="0" y="-1"/>
+            <a:ext cx="2855048" cy="1132410"/>
+          </a:xfrm>
+          <a:prstGeom prst="rect">
+            <a:avLst/>
+          </a:prstGeom>
+          <a:noFill/>
+          <a:extLst>
+            <a:ext uri="{909E8E84-426E-40DD-AFC4-6F175D3DCCD1}">
+              <a14:hiddenFill xmlns:a14="http://schemas.microsoft.com/office/drawing/2010/main">
+                <a:solidFill>
+                  <a:srgbClr val="FFFFFF"/>
+                </a:solidFill>
+              </a14:hiddenFill>
+            </a:ext>
+          </a:extLst>
+        </p:spPr>
+      </p:pic>
+      <p:pic>
+        <p:nvPicPr>
+          <p:cNvPr id="10" name="Picture 2" descr="Ice Cream Background Images - Free Download on Freepik">
+            <a:extLst>
+              <a:ext uri="{FF2B5EF4-FFF2-40B4-BE49-F238E27FC236}">
+                <a16:creationId xmlns:a16="http://schemas.microsoft.com/office/drawing/2014/main" id="{A3E90282-751F-9D4C-4293-1E0A0106B4D8}"/>
+              </a:ext>
+            </a:extLst>
+          </p:cNvPr>
+          <p:cNvPicPr>
+            <a:picLocks noChangeAspect="1" noChangeArrowheads="1"/>
+          </p:cNvPicPr>
+          <p:nvPr/>
+        </p:nvPicPr>
+        <p:blipFill rotWithShape="1">
+          <a:blip r:embed="rId2">
+            <a:extLst>
+              <a:ext uri="{28A0092B-C50C-407E-A947-70E740481C1C}">
+                <a14:useLocalDpi xmlns:a14="http://schemas.microsoft.com/office/drawing/2010/main" val="0"/>
+              </a:ext>
+            </a:extLst>
+          </a:blip>
+          <a:srcRect t="40457"/>
+          <a:stretch/>
+        </p:blipFill>
+        <p:spPr bwMode="auto">
+          <a:xfrm rot="10800000">
+            <a:off x="2838944" y="0"/>
+            <a:ext cx="2855048" cy="1132410"/>
+          </a:xfrm>
+          <a:prstGeom prst="rect">
+            <a:avLst/>
+          </a:prstGeom>
+          <a:noFill/>
+          <a:extLst>
+            <a:ext uri="{909E8E84-426E-40DD-AFC4-6F175D3DCCD1}">
+              <a14:hiddenFill xmlns:a14="http://schemas.microsoft.com/office/drawing/2010/main">
+                <a:solidFill>
+                  <a:srgbClr val="FFFFFF"/>
+                </a:solidFill>
+              </a14:hiddenFill>
+            </a:ext>
+          </a:extLst>
+        </p:spPr>
+      </p:pic>
+      <p:pic>
+        <p:nvPicPr>
+          <p:cNvPr id="11" name="Picture 2" descr="Ice Cream Background Images - Free Download on Freepik">
+            <a:extLst>
+              <a:ext uri="{FF2B5EF4-FFF2-40B4-BE49-F238E27FC236}">
+                <a16:creationId xmlns:a16="http://schemas.microsoft.com/office/drawing/2014/main" id="{6364D656-9389-EE86-C28B-BEAE750EB13E}"/>
+              </a:ext>
+            </a:extLst>
+          </p:cNvPr>
+          <p:cNvPicPr>
+            <a:picLocks noChangeAspect="1" noChangeArrowheads="1"/>
+          </p:cNvPicPr>
+          <p:nvPr/>
+        </p:nvPicPr>
+        <p:blipFill rotWithShape="1">
+          <a:blip r:embed="rId2">
+            <a:extLst>
+              <a:ext uri="{28A0092B-C50C-407E-A947-70E740481C1C}">
+                <a14:useLocalDpi xmlns:a14="http://schemas.microsoft.com/office/drawing/2010/main" val="0"/>
+              </a:ext>
+            </a:extLst>
+          </a:blip>
+          <a:srcRect t="40457"/>
+          <a:stretch/>
+        </p:blipFill>
+        <p:spPr bwMode="auto">
+          <a:xfrm rot="10800000">
+            <a:off x="5677888" y="0"/>
+            <a:ext cx="2855048" cy="1132410"/>
+          </a:xfrm>
+          <a:prstGeom prst="rect">
+            <a:avLst/>
+          </a:prstGeom>
+          <a:noFill/>
+          <a:extLst>
+            <a:ext uri="{909E8E84-426E-40DD-AFC4-6F175D3DCCD1}">
+              <a14:hiddenFill xmlns:a14="http://schemas.microsoft.com/office/drawing/2010/main">
+                <a:solidFill>
+                  <a:srgbClr val="FFFFFF"/>
+                </a:solidFill>
+              </a14:hiddenFill>
+            </a:ext>
+          </a:extLst>
+        </p:spPr>
+      </p:pic>
+      <p:pic>
+        <p:nvPicPr>
+          <p:cNvPr id="12" name="Picture 2" descr="Ice Cream Background Images - Free Download on Freepik">
+            <a:extLst>
+              <a:ext uri="{FF2B5EF4-FFF2-40B4-BE49-F238E27FC236}">
+                <a16:creationId xmlns:a16="http://schemas.microsoft.com/office/drawing/2014/main" id="{A0D2EF70-E0EF-23E8-6973-45EADA4B9DCD}"/>
+              </a:ext>
+            </a:extLst>
+          </p:cNvPr>
+          <p:cNvPicPr>
+            <a:picLocks noChangeAspect="1" noChangeArrowheads="1"/>
+          </p:cNvPicPr>
+          <p:nvPr/>
+        </p:nvPicPr>
+        <p:blipFill rotWithShape="1">
+          <a:blip r:embed="rId2">
+            <a:extLst>
+              <a:ext uri="{28A0092B-C50C-407E-A947-70E740481C1C}">
+                <a14:useLocalDpi xmlns:a14="http://schemas.microsoft.com/office/drawing/2010/main" val="0"/>
+              </a:ext>
+            </a:extLst>
+          </a:blip>
+          <a:srcRect t="40457"/>
+          <a:stretch/>
+        </p:blipFill>
+        <p:spPr bwMode="auto">
+          <a:xfrm>
+            <a:off x="6479766" y="5731977"/>
+            <a:ext cx="2838944" cy="1126023"/>
+          </a:xfrm>
+          <a:prstGeom prst="rect">
+            <a:avLst/>
+          </a:prstGeom>
+          <a:noFill/>
+          <a:extLst>
+            <a:ext uri="{909E8E84-426E-40DD-AFC4-6F175D3DCCD1}">
+              <a14:hiddenFill xmlns:a14="http://schemas.microsoft.com/office/drawing/2010/main">
+                <a:solidFill>
+                  <a:srgbClr val="FFFFFF"/>
+                </a:solidFill>
+              </a14:hiddenFill>
+            </a:ext>
+          </a:extLst>
+        </p:spPr>
+      </p:pic>
+    </p:spTree>
+    <p:extLst>
+      <p:ext uri="{BB962C8B-B14F-4D97-AF65-F5344CB8AC3E}">
+        <p14:creationId xmlns:p14="http://schemas.microsoft.com/office/powerpoint/2010/main" val="4159543792"/>
+      </p:ext>
+    </p:extLst>
+  </p:cSld>
+  <p:clrMapOvr>
+    <a:masterClrMapping/>
+  </p:clrMapOvr>
+</p:sld>
+</file>
+
+<file path=ppt/slides/slide9.xml><?xml version="1.0" encoding="utf-8"?>
+<p:sld xmlns:a="http://schemas.openxmlformats.org/drawingml/2006/main" xmlns:r="http://schemas.openxmlformats.org/officeDocument/2006/relationships" xmlns:p="http://schemas.openxmlformats.org/presentationml/2006/main">
+  <p:cSld>
+    <p:bg>
+      <p:bgPr>
+        <a:solidFill>
+          <a:schemeClr val="tx1">
+            <a:lumMod val="85000"/>
+            <a:lumOff val="15000"/>
+          </a:schemeClr>
+        </a:solidFill>
+        <a:effectLst/>
+      </p:bgPr>
+    </p:bg>
+    <p:spTree>
+      <p:nvGrpSpPr>
+        <p:cNvPr id="1" name=""/>
+        <p:cNvGrpSpPr/>
+        <p:nvPr/>
+      </p:nvGrpSpPr>
+      <p:grpSpPr>
+        <a:xfrm>
+          <a:off x="0" y="0"/>
+          <a:ext cx="0" cy="0"/>
+          <a:chOff x="0" y="0"/>
+          <a:chExt cx="0" cy="0"/>
+        </a:xfrm>
+      </p:grpSpPr>
+      <p:pic>
+        <p:nvPicPr>
+          <p:cNvPr id="1026" name="Picture 2" descr="Ice Cream Background Images - Free Download on Freepik">
+            <a:extLst>
+              <a:ext uri="{FF2B5EF4-FFF2-40B4-BE49-F238E27FC236}">
+                <a16:creationId xmlns:a16="http://schemas.microsoft.com/office/drawing/2014/main" id="{704EEFB9-84E0-3624-F682-D62CCEC55EAC}"/>
+              </a:ext>
+            </a:extLst>
+          </p:cNvPr>
+          <p:cNvPicPr>
+            <a:picLocks noChangeAspect="1" noChangeArrowheads="1"/>
+          </p:cNvPicPr>
+          <p:nvPr/>
+        </p:nvPicPr>
+        <p:blipFill rotWithShape="1">
+          <a:blip r:embed="rId2">
+            <a:extLst>
+              <a:ext uri="{28A0092B-C50C-407E-A947-70E740481C1C}">
+                <a14:useLocalDpi xmlns:a14="http://schemas.microsoft.com/office/drawing/2010/main" val="0"/>
+              </a:ext>
+            </a:extLst>
+          </a:blip>
+          <a:srcRect t="40457"/>
+          <a:stretch/>
+        </p:blipFill>
+        <p:spPr bwMode="auto">
+          <a:xfrm>
+            <a:off x="713064" y="5696751"/>
+            <a:ext cx="2927758" cy="1161249"/>
+          </a:xfrm>
+          <a:prstGeom prst="rect">
+            <a:avLst/>
+          </a:prstGeom>
+          <a:noFill/>
+          <a:extLst>
+            <a:ext uri="{909E8E84-426E-40DD-AFC4-6F175D3DCCD1}">
+              <a14:hiddenFill xmlns:a14="http://schemas.microsoft.com/office/drawing/2010/main">
+                <a:solidFill>
+                  <a:srgbClr val="FFFFFF"/>
+                </a:solidFill>
+              </a14:hiddenFill>
+            </a:ext>
+          </a:extLst>
+        </p:spPr>
+      </p:pic>
+      <p:pic>
+        <p:nvPicPr>
+          <p:cNvPr id="6" name="Picture 2" descr="Ice Cream Background Images - Free Download on Freepik">
+            <a:extLst>
+              <a:ext uri="{FF2B5EF4-FFF2-40B4-BE49-F238E27FC236}">
+                <a16:creationId xmlns:a16="http://schemas.microsoft.com/office/drawing/2014/main" id="{96A64833-64F8-8B29-8E1B-113B889E0707}"/>
+              </a:ext>
+            </a:extLst>
+          </p:cNvPr>
+          <p:cNvPicPr>
+            <a:picLocks noChangeAspect="1" noChangeArrowheads="1"/>
+          </p:cNvPicPr>
+          <p:nvPr/>
+        </p:nvPicPr>
+        <p:blipFill rotWithShape="1">
+          <a:blip r:embed="rId2">
+            <a:extLst>
+              <a:ext uri="{28A0092B-C50C-407E-A947-70E740481C1C}">
+                <a14:useLocalDpi xmlns:a14="http://schemas.microsoft.com/office/drawing/2010/main" val="0"/>
+              </a:ext>
+            </a:extLst>
+          </a:blip>
+          <a:srcRect t="40457"/>
+          <a:stretch/>
+        </p:blipFill>
+        <p:spPr bwMode="auto">
+          <a:xfrm>
+            <a:off x="3640822" y="5696750"/>
+            <a:ext cx="2838944" cy="1126023"/>
+          </a:xfrm>
+          <a:prstGeom prst="rect">
+            <a:avLst/>
+          </a:prstGeom>
+          <a:noFill/>
+          <a:extLst>
+            <a:ext uri="{909E8E84-426E-40DD-AFC4-6F175D3DCCD1}">
+              <a14:hiddenFill xmlns:a14="http://schemas.microsoft.com/office/drawing/2010/main">
+                <a:solidFill>
+                  <a:srgbClr val="FFFFFF"/>
+                </a:solidFill>
+              </a14:hiddenFill>
+            </a:ext>
+          </a:extLst>
+        </p:spPr>
+      </p:pic>
+      <p:pic>
+        <p:nvPicPr>
+          <p:cNvPr id="9" name="Picture 2" descr="Ice Cream Background Images - Free Download on Freepik">
+            <a:extLst>
+              <a:ext uri="{FF2B5EF4-FFF2-40B4-BE49-F238E27FC236}">
+                <a16:creationId xmlns:a16="http://schemas.microsoft.com/office/drawing/2014/main" id="{D21EDCC6-3BA7-5CC3-3E9B-190A46CF596D}"/>
+              </a:ext>
+            </a:extLst>
+          </p:cNvPr>
+          <p:cNvPicPr>
+            <a:picLocks noChangeAspect="1" noChangeArrowheads="1"/>
+          </p:cNvPicPr>
+          <p:nvPr/>
+        </p:nvPicPr>
+        <p:blipFill rotWithShape="1">
+          <a:blip r:embed="rId2">
+            <a:extLst>
+              <a:ext uri="{28A0092B-C50C-407E-A947-70E740481C1C}">
+                <a14:useLocalDpi xmlns:a14="http://schemas.microsoft.com/office/drawing/2010/main" val="0"/>
+              </a:ext>
+            </a:extLst>
+          </a:blip>
+          <a:srcRect t="40457"/>
+          <a:stretch/>
+        </p:blipFill>
+        <p:spPr bwMode="auto">
+          <a:xfrm rot="10800000">
+            <a:off x="0" y="-1"/>
+            <a:ext cx="2855048" cy="1132410"/>
+          </a:xfrm>
+          <a:prstGeom prst="rect">
+            <a:avLst/>
+          </a:prstGeom>
+          <a:noFill/>
+          <a:extLst>
+            <a:ext uri="{909E8E84-426E-40DD-AFC4-6F175D3DCCD1}">
+              <a14:hiddenFill xmlns:a14="http://schemas.microsoft.com/office/drawing/2010/main">
+                <a:solidFill>
+                  <a:srgbClr val="FFFFFF"/>
+                </a:solidFill>
+              </a14:hiddenFill>
+            </a:ext>
+          </a:extLst>
+        </p:spPr>
+      </p:pic>
+      <p:pic>
+        <p:nvPicPr>
+          <p:cNvPr id="10" name="Picture 2" descr="Ice Cream Background Images - Free Download on Freepik">
+            <a:extLst>
+              <a:ext uri="{FF2B5EF4-FFF2-40B4-BE49-F238E27FC236}">
+                <a16:creationId xmlns:a16="http://schemas.microsoft.com/office/drawing/2014/main" id="{A3E90282-751F-9D4C-4293-1E0A0106B4D8}"/>
+              </a:ext>
+            </a:extLst>
+          </p:cNvPr>
+          <p:cNvPicPr>
+            <a:picLocks noChangeAspect="1" noChangeArrowheads="1"/>
+          </p:cNvPicPr>
+          <p:nvPr/>
+        </p:nvPicPr>
+        <p:blipFill rotWithShape="1">
+          <a:blip r:embed="rId2">
+            <a:extLst>
+              <a:ext uri="{28A0092B-C50C-407E-A947-70E740481C1C}">
+                <a14:useLocalDpi xmlns:a14="http://schemas.microsoft.com/office/drawing/2010/main" val="0"/>
+              </a:ext>
+            </a:extLst>
+          </a:blip>
+          <a:srcRect t="40457"/>
+          <a:stretch/>
+        </p:blipFill>
+        <p:spPr bwMode="auto">
+          <a:xfrm rot="10800000">
+            <a:off x="2838944" y="0"/>
+            <a:ext cx="2855048" cy="1132410"/>
+          </a:xfrm>
+          <a:prstGeom prst="rect">
+            <a:avLst/>
+          </a:prstGeom>
+          <a:noFill/>
+          <a:extLst>
+            <a:ext uri="{909E8E84-426E-40DD-AFC4-6F175D3DCCD1}">
+              <a14:hiddenFill xmlns:a14="http://schemas.microsoft.com/office/drawing/2010/main">
+                <a:solidFill>
+                  <a:srgbClr val="FFFFFF"/>
+                </a:solidFill>
+              </a14:hiddenFill>
+            </a:ext>
+          </a:extLst>
+        </p:spPr>
+      </p:pic>
+      <p:pic>
+        <p:nvPicPr>
+          <p:cNvPr id="11" name="Picture 2" descr="Ice Cream Background Images - Free Download on Freepik">
+            <a:extLst>
+              <a:ext uri="{FF2B5EF4-FFF2-40B4-BE49-F238E27FC236}">
+                <a16:creationId xmlns:a16="http://schemas.microsoft.com/office/drawing/2014/main" id="{6364D656-9389-EE86-C28B-BEAE750EB13E}"/>
+              </a:ext>
+            </a:extLst>
+          </p:cNvPr>
+          <p:cNvPicPr>
+            <a:picLocks noChangeAspect="1" noChangeArrowheads="1"/>
+          </p:cNvPicPr>
+          <p:nvPr/>
+        </p:nvPicPr>
+        <p:blipFill rotWithShape="1">
+          <a:blip r:embed="rId2">
+            <a:extLst>
+              <a:ext uri="{28A0092B-C50C-407E-A947-70E740481C1C}">
+                <a14:useLocalDpi xmlns:a14="http://schemas.microsoft.com/office/drawing/2010/main" val="0"/>
+              </a:ext>
+            </a:extLst>
+          </a:blip>
+          <a:srcRect t="40457"/>
+          <a:stretch/>
+        </p:blipFill>
+        <p:spPr bwMode="auto">
+          <a:xfrm rot="10800000">
+            <a:off x="5677888" y="0"/>
+            <a:ext cx="2855048" cy="1132410"/>
+          </a:xfrm>
+          <a:prstGeom prst="rect">
+            <a:avLst/>
+          </a:prstGeom>
+          <a:noFill/>
+          <a:extLst>
+            <a:ext uri="{909E8E84-426E-40DD-AFC4-6F175D3DCCD1}">
+              <a14:hiddenFill xmlns:a14="http://schemas.microsoft.com/office/drawing/2010/main">
+                <a:solidFill>
+                  <a:srgbClr val="FFFFFF"/>
+                </a:solidFill>
+              </a14:hiddenFill>
+            </a:ext>
+          </a:extLst>
+        </p:spPr>
+      </p:pic>
+      <p:pic>
+        <p:nvPicPr>
+          <p:cNvPr id="12" name="Picture 2" descr="Ice Cream Background Images - Free Download on Freepik">
+            <a:extLst>
+              <a:ext uri="{FF2B5EF4-FFF2-40B4-BE49-F238E27FC236}">
+                <a16:creationId xmlns:a16="http://schemas.microsoft.com/office/drawing/2014/main" id="{A0D2EF70-E0EF-23E8-6973-45EADA4B9DCD}"/>
+              </a:ext>
+            </a:extLst>
+          </p:cNvPr>
+          <p:cNvPicPr>
+            <a:picLocks noChangeAspect="1" noChangeArrowheads="1"/>
+          </p:cNvPicPr>
+          <p:nvPr/>
+        </p:nvPicPr>
+        <p:blipFill rotWithShape="1">
+          <a:blip r:embed="rId2">
+            <a:extLst>
+              <a:ext uri="{28A0092B-C50C-407E-A947-70E740481C1C}">
+                <a14:useLocalDpi xmlns:a14="http://schemas.microsoft.com/office/drawing/2010/main" val="0"/>
+              </a:ext>
+            </a:extLst>
+          </a:blip>
+          <a:srcRect t="40457"/>
+          <a:stretch/>
+        </p:blipFill>
+        <p:spPr bwMode="auto">
+          <a:xfrm>
+            <a:off x="6479766" y="5731977"/>
+            <a:ext cx="2838944" cy="1126023"/>
+          </a:xfrm>
+          <a:prstGeom prst="rect">
+            <a:avLst/>
+          </a:prstGeom>
+          <a:noFill/>
+          <a:extLst>
+            <a:ext uri="{909E8E84-426E-40DD-AFC4-6F175D3DCCD1}">
+              <a14:hiddenFill xmlns:a14="http://schemas.microsoft.com/office/drawing/2010/main">
+                <a:solidFill>
+                  <a:srgbClr val="FFFFFF"/>
+                </a:solidFill>
+              </a14:hiddenFill>
+            </a:ext>
+          </a:extLst>
+        </p:spPr>
+      </p:pic>
+      <p:sp>
+        <p:nvSpPr>
+          <p:cNvPr id="2" name="TextBox 1">
+            <a:extLst>
+              <a:ext uri="{FF2B5EF4-FFF2-40B4-BE49-F238E27FC236}">
+                <a16:creationId xmlns:a16="http://schemas.microsoft.com/office/drawing/2014/main" id="{82C6A7E2-10BC-F806-77C1-EB8A4F228461}"/>
+              </a:ext>
+            </a:extLst>
+          </p:cNvPr>
+          <p:cNvSpPr txBox="1"/>
+          <p:nvPr/>
+        </p:nvSpPr>
+        <p:spPr>
+          <a:xfrm>
+            <a:off x="5454176" y="2154921"/>
+            <a:ext cx="6157519" cy="3170099"/>
+          </a:xfrm>
+          <a:prstGeom prst="rect">
+            <a:avLst/>
+          </a:prstGeom>
+          <a:noFill/>
+        </p:spPr>
+        <p:txBody>
+          <a:bodyPr wrap="square" rtlCol="0">
+            <a:spAutoFit/>
+          </a:bodyPr>
+          <a:lstStyle/>
+          <a:p>
+            <a:r>
+              <a:rPr lang="fr-FR" sz="4000" dirty="0">
+                <a:solidFill>
+                  <a:srgbClr val="FFFFFF"/>
+                </a:solidFill>
+                <a:latin typeface="Britannic Bold" panose="020B0903060703020204" pitchFamily="34" charset="0"/>
+                <a:ea typeface="ADLaM Display" panose="020F0502020204030204" pitchFamily="2" charset="0"/>
+                <a:cs typeface="ADLaM Display" panose="020F0502020204030204" pitchFamily="2" charset="0"/>
+              </a:rPr>
+              <a:t>Hello world </a:t>
+            </a:r>
+          </a:p>
+          <a:p>
+            <a:r>
+              <a:rPr lang="fr-FR" sz="4000" dirty="0">
+                <a:solidFill>
+                  <a:srgbClr val="FFFFFF"/>
+                </a:solidFill>
+                <a:latin typeface="Britannic Bold" panose="020B0903060703020204" pitchFamily="34" charset="0"/>
+                <a:ea typeface="ADLaM Display" panose="020F0502020204030204" pitchFamily="2" charset="0"/>
+                <a:cs typeface="ADLaM Display" panose="020F0502020204030204" pitchFamily="2" charset="0"/>
+              </a:rPr>
+              <a:t>Icecream </a:t>
+            </a:r>
+            <a:r>
+              <a:rPr lang="fr-FR" sz="4000" dirty="0" err="1">
+                <a:solidFill>
+                  <a:srgbClr val="FFFFFF"/>
+                </a:solidFill>
+                <a:latin typeface="Britannic Bold" panose="020B0903060703020204" pitchFamily="34" charset="0"/>
+                <a:ea typeface="ADLaM Display" panose="020F0502020204030204" pitchFamily="2" charset="0"/>
+                <a:cs typeface="ADLaM Display" panose="020F0502020204030204" pitchFamily="2" charset="0"/>
+              </a:rPr>
+              <a:t>orders</a:t>
+            </a:r>
+            <a:r>
+              <a:rPr lang="fr-FR" sz="4000" dirty="0">
+                <a:solidFill>
+                  <a:srgbClr val="FFFFFF"/>
+                </a:solidFill>
+                <a:latin typeface="Britannic Bold" panose="020B0903060703020204" pitchFamily="34" charset="0"/>
+                <a:ea typeface="ADLaM Display" panose="020F0502020204030204" pitchFamily="2" charset="0"/>
+                <a:cs typeface="ADLaM Display" panose="020F0502020204030204" pitchFamily="2" charset="0"/>
+              </a:rPr>
+              <a:t> </a:t>
+            </a:r>
+          </a:p>
+          <a:p>
+            <a:r>
+              <a:rPr lang="fr-FR" sz="4000" dirty="0">
+                <a:solidFill>
+                  <a:srgbClr val="FFFFFF"/>
+                </a:solidFill>
+                <a:latin typeface="Britannic Bold" panose="020B0903060703020204" pitchFamily="34" charset="0"/>
+                <a:ea typeface="ADLaM Display" panose="020F0502020204030204" pitchFamily="2" charset="0"/>
+                <a:cs typeface="ADLaM Display" panose="020F0502020204030204" pitchFamily="2" charset="0"/>
+              </a:rPr>
+              <a:t>NEXT </a:t>
+            </a:r>
+          </a:p>
+          <a:p>
+            <a:r>
+              <a:rPr lang="fr-FR" sz="4000" dirty="0">
+                <a:solidFill>
+                  <a:srgbClr val="FFFFFF"/>
+                </a:solidFill>
+                <a:latin typeface="Britannic Bold" panose="020B0903060703020204" pitchFamily="34" charset="0"/>
+                <a:ea typeface="ADLaM Display" panose="020F0502020204030204" pitchFamily="2" charset="0"/>
+                <a:cs typeface="ADLaM Display" panose="020F0502020204030204" pitchFamily="2" charset="0"/>
+              </a:rPr>
+              <a:t>RETRY</a:t>
+            </a:r>
+          </a:p>
+          <a:p>
+            <a:r>
+              <a:rPr lang="fr-FR" sz="4000" dirty="0">
+                <a:solidFill>
+                  <a:srgbClr val="FFFFFF"/>
+                </a:solidFill>
+                <a:latin typeface="Britannic Bold" panose="020B0903060703020204" pitchFamily="34" charset="0"/>
+                <a:ea typeface="ADLaM Display" panose="020F0502020204030204" pitchFamily="2" charset="0"/>
+                <a:cs typeface="ADLaM Display" panose="020F0502020204030204" pitchFamily="2" charset="0"/>
+              </a:rPr>
+              <a:t>1 2 3 36</a:t>
+            </a:r>
+          </a:p>
+        </p:txBody>
+      </p:sp>
+    </p:spTree>
+    <p:extLst>
+      <p:ext uri="{BB962C8B-B14F-4D97-AF65-F5344CB8AC3E}">
+        <p14:creationId xmlns:p14="http://schemas.microsoft.com/office/powerpoint/2010/main" val="16631674"/>
       </p:ext>
     </p:extLst>
   </p:cSld>

</xml_diff>